<commit_message>
base di 15% di batteria
</commit_message>
<xml_diff>
--- a/Materiale Extra/Presentazione del progetto .pptx
+++ b/Materiale Extra/Presentazione del progetto .pptx
@@ -13,10 +13,11 @@
     <p:sldId id="261" r:id="rId7"/>
     <p:sldId id="262" r:id="rId8"/>
     <p:sldId id="263" r:id="rId9"/>
-    <p:sldId id="264" r:id="rId10"/>
-    <p:sldId id="265" r:id="rId11"/>
-    <p:sldId id="266" r:id="rId12"/>
-    <p:sldId id="267" r:id="rId13"/>
+    <p:sldId id="268" r:id="rId10"/>
+    <p:sldId id="264" r:id="rId11"/>
+    <p:sldId id="265" r:id="rId12"/>
+    <p:sldId id="266" r:id="rId13"/>
+    <p:sldId id="267" r:id="rId14"/>
   </p:sldIdLst>
   <p:sldSz cx="12192000" cy="6858000"/>
   <p:notesSz cx="6858000" cy="9144000"/>
@@ -115,239 +116,12 @@
       </a:defRPr>
     </a:lvl9pPr>
   </p:defaultTextStyle>
+  <p:extLst>
+    <p:ext uri="{EFAFB233-063F-42B5-8137-9DF3F51BA10A}">
+      <p15:sldGuideLst xmlns:p15="http://schemas.microsoft.com/office/powerpoint/2012/main"/>
+    </p:ext>
+  </p:extLst>
 </p:presentation>
-</file>
-
-<file path=ppt/ink/ink1.xml><?xml version="1.0" encoding="utf-8"?>
-<inkml:ink xmlns:inkml="http://www.w3.org/2003/InkML">
-  <inkml:definitions>
-    <inkml:context xml:id="ctx0">
-      <inkml:inkSource xml:id="inkSrc0">
-        <inkml:traceFormat>
-          <inkml:channel name="X" type="integer" min="-2.14748E9" max="2.14748E9" units="cm"/>
-          <inkml:channel name="Y" type="integer" min="-2.14748E9" max="2.14748E9" units="cm"/>
-        </inkml:traceFormat>
-        <inkml:channelProperties>
-          <inkml:channelProperty channel="X" name="resolution" value="1000" units="1/cm"/>
-          <inkml:channelProperty channel="Y" name="resolution" value="1000" units="1/cm"/>
-        </inkml:channelProperties>
-      </inkml:inkSource>
-      <inkml:timestamp xml:id="ts0" timeString="2023-05-14T18:36:25.317"/>
-    </inkml:context>
-    <inkml:brush xml:id="br0">
-      <inkml:brushProperty name="width" value="0.3" units="cm"/>
-      <inkml:brushProperty name="height" value="0.6" units="cm"/>
-      <inkml:brushProperty name="color" value="#FFFC00"/>
-      <inkml:brushProperty name="tip" value="rectangle"/>
-      <inkml:brushProperty name="rasterOp" value="maskPen"/>
-      <inkml:brushProperty name="ignorePressure" value="1"/>
-    </inkml:brush>
-  </inkml:definitions>
-  <inkml:trace contextRef="#ctx0" brushRef="#br0">1 82,'151'9,"-50"-2,614 4,-622-18,149-30,-172 23,0 4,125-3,-187 13,54 1,-1-3,79-12,-70 6,0 3,108 6,-64 1,-66-2,23-1,0 3,76 13,-109-10,73-1,-76-5,0 2,62 11,27 4,-2 0,-100-12,-2 0</inkml:trace>
-</inkml:ink>
-</file>
-
-<file path=ppt/ink/ink2.xml><?xml version="1.0" encoding="utf-8"?>
-<inkml:ink xmlns:inkml="http://www.w3.org/2003/InkML">
-  <inkml:definitions>
-    <inkml:context xml:id="ctx0">
-      <inkml:inkSource xml:id="inkSrc0">
-        <inkml:traceFormat>
-          <inkml:channel name="X" type="integer" min="-2.14748E9" max="2.14748E9" units="cm"/>
-          <inkml:channel name="Y" type="integer" min="-2.14748E9" max="2.14748E9" units="cm"/>
-        </inkml:traceFormat>
-        <inkml:channelProperties>
-          <inkml:channelProperty channel="X" name="resolution" value="1000" units="1/cm"/>
-          <inkml:channelProperty channel="Y" name="resolution" value="1000" units="1/cm"/>
-        </inkml:channelProperties>
-      </inkml:inkSource>
-      <inkml:timestamp xml:id="ts0" timeString="2023-05-14T18:36:28.331"/>
-    </inkml:context>
-    <inkml:brush xml:id="br0">
-      <inkml:brushProperty name="width" value="0.3" units="cm"/>
-      <inkml:brushProperty name="height" value="0.6" units="cm"/>
-      <inkml:brushProperty name="color" value="#FFFC00"/>
-      <inkml:brushProperty name="tip" value="rectangle"/>
-      <inkml:brushProperty name="rasterOp" value="maskPen"/>
-      <inkml:brushProperty name="ignorePressure" value="1"/>
-    </inkml:brush>
-  </inkml:definitions>
-  <inkml:trace contextRef="#ctx0" brushRef="#br0">1 1,'16'4,"-1"0,2-1,-1-1,0-1,18 0,1 1,1027 11,-665-16,567 3,-935 0</inkml:trace>
-</inkml:ink>
-</file>
-
-<file path=ppt/ink/ink3.xml><?xml version="1.0" encoding="utf-8"?>
-<inkml:ink xmlns:inkml="http://www.w3.org/2003/InkML">
-  <inkml:definitions>
-    <inkml:context xml:id="ctx0">
-      <inkml:inkSource xml:id="inkSrc0">
-        <inkml:traceFormat>
-          <inkml:channel name="X" type="integer" min="-2.14748E9" max="2.14748E9" units="cm"/>
-          <inkml:channel name="Y" type="integer" min="-2.14748E9" max="2.14748E9" units="cm"/>
-        </inkml:traceFormat>
-        <inkml:channelProperties>
-          <inkml:channelProperty channel="X" name="resolution" value="1000" units="1/cm"/>
-          <inkml:channelProperty channel="Y" name="resolution" value="1000" units="1/cm"/>
-        </inkml:channelProperties>
-      </inkml:inkSource>
-      <inkml:timestamp xml:id="ts0" timeString="2023-05-14T18:36:42.088"/>
-    </inkml:context>
-    <inkml:brush xml:id="br0">
-      <inkml:brushProperty name="width" value="0.3" units="cm"/>
-      <inkml:brushProperty name="height" value="0.6" units="cm"/>
-      <inkml:brushProperty name="color" value="#FFFC00"/>
-      <inkml:brushProperty name="tip" value="rectangle"/>
-      <inkml:brushProperty name="rasterOp" value="maskPen"/>
-      <inkml:brushProperty name="ignorePressure" value="1"/>
-    </inkml:brush>
-  </inkml:definitions>
-  <inkml:trace contextRef="#ctx0" brushRef="#br0">1 1,'117'5,"130"23,-164-17,91 13,203 23,2-27,470-23,-823 2,-1-2,0-1,-1-1,29-9,-25 6,0 1,50-5,37 10,-65 3,74-10,-16-1,181 4,-186 7,-75-1</inkml:trace>
-</inkml:ink>
-</file>
-
-<file path=ppt/ink/ink4.xml><?xml version="1.0" encoding="utf-8"?>
-<inkml:ink xmlns:inkml="http://www.w3.org/2003/InkML">
-  <inkml:definitions>
-    <inkml:context xml:id="ctx0">
-      <inkml:inkSource xml:id="inkSrc0">
-        <inkml:traceFormat>
-          <inkml:channel name="X" type="integer" min="-2.14748E9" max="2.14748E9" units="cm"/>
-          <inkml:channel name="Y" type="integer" min="-2.14748E9" max="2.14748E9" units="cm"/>
-        </inkml:traceFormat>
-        <inkml:channelProperties>
-          <inkml:channelProperty channel="X" name="resolution" value="1000" units="1/cm"/>
-          <inkml:channelProperty channel="Y" name="resolution" value="1000" units="1/cm"/>
-        </inkml:channelProperties>
-      </inkml:inkSource>
-      <inkml:timestamp xml:id="ts0" timeString="2023-05-14T18:36:44.757"/>
-    </inkml:context>
-    <inkml:brush xml:id="br0">
-      <inkml:brushProperty name="width" value="0.3" units="cm"/>
-      <inkml:brushProperty name="height" value="0.6" units="cm"/>
-      <inkml:brushProperty name="color" value="#FFFC00"/>
-      <inkml:brushProperty name="tip" value="rectangle"/>
-      <inkml:brushProperty name="rasterOp" value="maskPen"/>
-      <inkml:brushProperty name="ignorePressure" value="1"/>
-    </inkml:brush>
-  </inkml:definitions>
-  <inkml:trace contextRef="#ctx0" brushRef="#br0">0 1,'456'16,"426"-4,-551-14,-295 4,60 10,-57-5,44 0,299-7,-359 0</inkml:trace>
-</inkml:ink>
-</file>
-
-<file path=ppt/ink/ink5.xml><?xml version="1.0" encoding="utf-8"?>
-<inkml:ink xmlns:inkml="http://www.w3.org/2003/InkML">
-  <inkml:definitions>
-    <inkml:context xml:id="ctx0">
-      <inkml:inkSource xml:id="inkSrc0">
-        <inkml:traceFormat>
-          <inkml:channel name="X" type="integer" min="-2.14748E9" max="2.14748E9" units="cm"/>
-          <inkml:channel name="Y" type="integer" min="-2.14748E9" max="2.14748E9" units="cm"/>
-        </inkml:traceFormat>
-        <inkml:channelProperties>
-          <inkml:channelProperty channel="X" name="resolution" value="1000" units="1/cm"/>
-          <inkml:channelProperty channel="Y" name="resolution" value="1000" units="1/cm"/>
-        </inkml:channelProperties>
-      </inkml:inkSource>
-      <inkml:timestamp xml:id="ts0" timeString="2023-05-14T18:36:50.580"/>
-    </inkml:context>
-    <inkml:brush xml:id="br0">
-      <inkml:brushProperty name="width" value="0.3" units="cm"/>
-      <inkml:brushProperty name="height" value="0.6" units="cm"/>
-      <inkml:brushProperty name="color" value="#FFFC00"/>
-      <inkml:brushProperty name="tip" value="rectangle"/>
-      <inkml:brushProperty name="rasterOp" value="maskPen"/>
-      <inkml:brushProperty name="ignorePressure" value="1"/>
-    </inkml:brush>
-  </inkml:definitions>
-  <inkml:trace contextRef="#ctx0" brushRef="#br0">0 83,'636'0,"-615"-2,-1 0,40-9,0-1,56-13,-83 16,0 2,0 1,43-2,265 10,-315-1,1 2,30 6,-28-3,44 2,203-9,-247 1</inkml:trace>
-</inkml:ink>
-</file>
-
-<file path=ppt/ink/ink6.xml><?xml version="1.0" encoding="utf-8"?>
-<inkml:ink xmlns:inkml="http://www.w3.org/2003/InkML">
-  <inkml:definitions>
-    <inkml:context xml:id="ctx0">
-      <inkml:inkSource xml:id="inkSrc0">
-        <inkml:traceFormat>
-          <inkml:channel name="X" type="integer" min="-2.14748E9" max="2.14748E9" units="cm"/>
-          <inkml:channel name="Y" type="integer" min="-2.14748E9" max="2.14748E9" units="cm"/>
-        </inkml:traceFormat>
-        <inkml:channelProperties>
-          <inkml:channelProperty channel="X" name="resolution" value="1000" units="1/cm"/>
-          <inkml:channelProperty channel="Y" name="resolution" value="1000" units="1/cm"/>
-        </inkml:channelProperties>
-      </inkml:inkSource>
-      <inkml:timestamp xml:id="ts0" timeString="2023-05-14T18:36:53.217"/>
-    </inkml:context>
-    <inkml:brush xml:id="br0">
-      <inkml:brushProperty name="width" value="0.3" units="cm"/>
-      <inkml:brushProperty name="height" value="0.6" units="cm"/>
-      <inkml:brushProperty name="color" value="#FFFC00"/>
-      <inkml:brushProperty name="tip" value="rectangle"/>
-      <inkml:brushProperty name="rasterOp" value="maskPen"/>
-      <inkml:brushProperty name="ignorePressure" value="1"/>
-    </inkml:brush>
-  </inkml:definitions>
-  <inkml:trace contextRef="#ctx0" brushRef="#br0">1 28,'1270'0,"-1250"-1,1-1,34-9,-33 7,0 0,24-1,6 4,-29 2</inkml:trace>
-</inkml:ink>
-</file>
-
-<file path=ppt/ink/ink7.xml><?xml version="1.0" encoding="utf-8"?>
-<inkml:ink xmlns:inkml="http://www.w3.org/2003/InkML">
-  <inkml:definitions>
-    <inkml:context xml:id="ctx0">
-      <inkml:inkSource xml:id="inkSrc0">
-        <inkml:traceFormat>
-          <inkml:channel name="X" type="integer" min="-2.14748E9" max="2.14748E9" units="cm"/>
-          <inkml:channel name="Y" type="integer" min="-2.14748E9" max="2.14748E9" units="cm"/>
-        </inkml:traceFormat>
-        <inkml:channelProperties>
-          <inkml:channelProperty channel="X" name="resolution" value="1000" units="1/cm"/>
-          <inkml:channelProperty channel="Y" name="resolution" value="1000" units="1/cm"/>
-        </inkml:channelProperties>
-      </inkml:inkSource>
-      <inkml:timestamp xml:id="ts0" timeString="2023-05-14T18:37:35.228"/>
-    </inkml:context>
-    <inkml:brush xml:id="br0">
-      <inkml:brushProperty name="width" value="0.3" units="cm"/>
-      <inkml:brushProperty name="height" value="0.6" units="cm"/>
-      <inkml:brushProperty name="color" value="#FFFC00"/>
-      <inkml:brushProperty name="tip" value="rectangle"/>
-      <inkml:brushProperty name="rasterOp" value="maskPen"/>
-      <inkml:brushProperty name="ignorePressure" value="1"/>
-    </inkml:brush>
-  </inkml:definitions>
-  <inkml:trace contextRef="#ctx0" brushRef="#br0">0 0,'42'3,"0"1,-1 3,51 13,-19-3,313 39,-242-32,-103-15,-1-2,73 3,460-11,-549-1,1 0,31-8,-29 5,44-3,6 8,-55 0</inkml:trace>
-</inkml:ink>
-</file>
-
-<file path=ppt/ink/ink8.xml><?xml version="1.0" encoding="utf-8"?>
-<inkml:ink xmlns:inkml="http://www.w3.org/2003/InkML">
-  <inkml:definitions>
-    <inkml:context xml:id="ctx0">
-      <inkml:inkSource xml:id="inkSrc0">
-        <inkml:traceFormat>
-          <inkml:channel name="X" type="integer" min="-2.14748E9" max="2.14748E9" units="cm"/>
-          <inkml:channel name="Y" type="integer" min="-2.14748E9" max="2.14748E9" units="cm"/>
-        </inkml:traceFormat>
-        <inkml:channelProperties>
-          <inkml:channelProperty channel="X" name="resolution" value="1000" units="1/cm"/>
-          <inkml:channelProperty channel="Y" name="resolution" value="1000" units="1/cm"/>
-        </inkml:channelProperties>
-      </inkml:inkSource>
-      <inkml:timestamp xml:id="ts0" timeString="2023-05-14T18:37:46.710"/>
-    </inkml:context>
-    <inkml:brush xml:id="br0">
-      <inkml:brushProperty name="width" value="0.3" units="cm"/>
-      <inkml:brushProperty name="height" value="0.6" units="cm"/>
-      <inkml:brushProperty name="color" value="#FFFC00"/>
-      <inkml:brushProperty name="tip" value="rectangle"/>
-      <inkml:brushProperty name="rasterOp" value="maskPen"/>
-      <inkml:brushProperty name="ignorePressure" value="1"/>
-    </inkml:brush>
-  </inkml:definitions>
-  <inkml:trace contextRef="#ctx0" brushRef="#br0">1 183,'702'0,"-662"-2,48-8,13-1,139 7,-199-1,-1-1,0-2,42-15,-46 11,36-9,254-32,-263 44,-11 1,80-2,316 11,-419-1</inkml:trace>
-</inkml:ink>
 </file>
 
 <file path=ppt/slideLayouts/slideLayout1.xml><?xml version="1.0" encoding="utf-8"?>
@@ -1072,7 +846,7 @@
           <a:p>
             <a:fld id="{C1775FA8-FEF5-4078-A009-D10F19796D95}" type="datetimeFigureOut">
               <a:rPr lang="it-IT" smtClean="0"/>
-              <a:t>14/05/2023</a:t>
+              <a:t>15/05/2023</a:t>
             </a:fld>
             <a:endParaRPr lang="it-IT"/>
           </a:p>
@@ -1323,7 +1097,7 @@
           <a:p>
             <a:fld id="{C1775FA8-FEF5-4078-A009-D10F19796D95}" type="datetimeFigureOut">
               <a:rPr lang="it-IT" smtClean="0"/>
-              <a:t>14/05/2023</a:t>
+              <a:t>15/05/2023</a:t>
             </a:fld>
             <a:endParaRPr lang="it-IT"/>
           </a:p>
@@ -1637,7 +1411,7 @@
           <a:p>
             <a:fld id="{C1775FA8-FEF5-4078-A009-D10F19796D95}" type="datetimeFigureOut">
               <a:rPr lang="it-IT" smtClean="0"/>
-              <a:t>14/05/2023</a:t>
+              <a:t>15/05/2023</a:t>
             </a:fld>
             <a:endParaRPr lang="it-IT"/>
           </a:p>
@@ -1978,7 +1752,7 @@
           <a:p>
             <a:fld id="{C1775FA8-FEF5-4078-A009-D10F19796D95}" type="datetimeFigureOut">
               <a:rPr lang="it-IT" smtClean="0"/>
-              <a:t>14/05/2023</a:t>
+              <a:t>15/05/2023</a:t>
             </a:fld>
             <a:endParaRPr lang="it-IT"/>
           </a:p>
@@ -2292,7 +2066,7 @@
           <a:p>
             <a:fld id="{C1775FA8-FEF5-4078-A009-D10F19796D95}" type="datetimeFigureOut">
               <a:rPr lang="it-IT" smtClean="0"/>
-              <a:t>14/05/2023</a:t>
+              <a:t>15/05/2023</a:t>
             </a:fld>
             <a:endParaRPr lang="it-IT"/>
           </a:p>
@@ -2685,7 +2459,7 @@
           <a:p>
             <a:fld id="{C1775FA8-FEF5-4078-A009-D10F19796D95}" type="datetimeFigureOut">
               <a:rPr lang="it-IT" smtClean="0"/>
-              <a:t>14/05/2023</a:t>
+              <a:t>15/05/2023</a:t>
             </a:fld>
             <a:endParaRPr lang="it-IT"/>
           </a:p>
@@ -2855,7 +2629,7 @@
           <a:p>
             <a:fld id="{C1775FA8-FEF5-4078-A009-D10F19796D95}" type="datetimeFigureOut">
               <a:rPr lang="it-IT" smtClean="0"/>
-              <a:t>14/05/2023</a:t>
+              <a:t>15/05/2023</a:t>
             </a:fld>
             <a:endParaRPr lang="it-IT"/>
           </a:p>
@@ -3035,7 +2809,7 @@
           <a:p>
             <a:fld id="{C1775FA8-FEF5-4078-A009-D10F19796D95}" type="datetimeFigureOut">
               <a:rPr lang="it-IT" smtClean="0"/>
-              <a:t>14/05/2023</a:t>
+              <a:t>15/05/2023</a:t>
             </a:fld>
             <a:endParaRPr lang="it-IT"/>
           </a:p>
@@ -3211,7 +2985,7 @@
           <a:p>
             <a:fld id="{C1775FA8-FEF5-4078-A009-D10F19796D95}" type="datetimeFigureOut">
               <a:rPr lang="it-IT" smtClean="0"/>
-              <a:t>14/05/2023</a:t>
+              <a:t>15/05/2023</a:t>
             </a:fld>
             <a:endParaRPr lang="it-IT"/>
           </a:p>
@@ -3458,7 +3232,7 @@
           <a:p>
             <a:fld id="{C1775FA8-FEF5-4078-A009-D10F19796D95}" type="datetimeFigureOut">
               <a:rPr lang="it-IT" smtClean="0"/>
-              <a:t>14/05/2023</a:t>
+              <a:t>15/05/2023</a:t>
             </a:fld>
             <a:endParaRPr lang="it-IT"/>
           </a:p>
@@ -3690,7 +3464,7 @@
           <a:p>
             <a:fld id="{C1775FA8-FEF5-4078-A009-D10F19796D95}" type="datetimeFigureOut">
               <a:rPr lang="it-IT" smtClean="0"/>
-              <a:t>14/05/2023</a:t>
+              <a:t>15/05/2023</a:t>
             </a:fld>
             <a:endParaRPr lang="it-IT"/>
           </a:p>
@@ -4064,7 +3838,7 @@
           <a:p>
             <a:fld id="{C1775FA8-FEF5-4078-A009-D10F19796D95}" type="datetimeFigureOut">
               <a:rPr lang="it-IT" smtClean="0"/>
-              <a:t>14/05/2023</a:t>
+              <a:t>15/05/2023</a:t>
             </a:fld>
             <a:endParaRPr lang="it-IT"/>
           </a:p>
@@ -4187,7 +3961,7 @@
           <a:p>
             <a:fld id="{C1775FA8-FEF5-4078-A009-D10F19796D95}" type="datetimeFigureOut">
               <a:rPr lang="it-IT" smtClean="0"/>
-              <a:t>14/05/2023</a:t>
+              <a:t>15/05/2023</a:t>
             </a:fld>
             <a:endParaRPr lang="it-IT"/>
           </a:p>
@@ -4282,7 +4056,7 @@
           <a:p>
             <a:fld id="{C1775FA8-FEF5-4078-A009-D10F19796D95}" type="datetimeFigureOut">
               <a:rPr lang="it-IT" smtClean="0"/>
-              <a:t>14/05/2023</a:t>
+              <a:t>15/05/2023</a:t>
             </a:fld>
             <a:endParaRPr lang="it-IT"/>
           </a:p>
@@ -4537,7 +4311,7 @@
           <a:p>
             <a:fld id="{C1775FA8-FEF5-4078-A009-D10F19796D95}" type="datetimeFigureOut">
               <a:rPr lang="it-IT" smtClean="0"/>
-              <a:t>14/05/2023</a:t>
+              <a:t>15/05/2023</a:t>
             </a:fld>
             <a:endParaRPr lang="it-IT"/>
           </a:p>
@@ -4800,7 +4574,7 @@
           <a:p>
             <a:fld id="{C1775FA8-FEF5-4078-A009-D10F19796D95}" type="datetimeFigureOut">
               <a:rPr lang="it-IT" smtClean="0"/>
-              <a:t>14/05/2023</a:t>
+              <a:t>15/05/2023</a:t>
             </a:fld>
             <a:endParaRPr lang="it-IT"/>
           </a:p>
@@ -5543,7 +5317,7 @@
           <a:p>
             <a:fld id="{C1775FA8-FEF5-4078-A009-D10F19796D95}" type="datetimeFigureOut">
               <a:rPr lang="it-IT" smtClean="0"/>
-              <a:t>14/05/2023</a:t>
+              <a:t>15/05/2023</a:t>
             </a:fld>
             <a:endParaRPr lang="it-IT"/>
           </a:p>
@@ -6512,7 +6286,7 @@
           <p:cNvPr id="2" name="Title 1">
             <a:extLst>
               <a:ext uri="{FF2B5EF4-FFF2-40B4-BE49-F238E27FC236}">
-                <a16:creationId xmlns:a16="http://schemas.microsoft.com/office/drawing/2014/main" id="{77BC3930-B11C-B4C8-CFAC-0FB08E550117}"/>
+                <a16:creationId xmlns:a16="http://schemas.microsoft.com/office/drawing/2014/main" id="{C5727A39-3120-BDEA-2583-D46E27C1035A}"/>
               </a:ext>
             </a:extLst>
           </p:cNvPr>
@@ -6531,28 +6305,15 @@
             <a:pPr algn="ctr"/>
             <a:r>
               <a:rPr lang="it-IT" dirty="0"/>
-              <a:t>Data </a:t>
-            </a:r>
-            <a:r>
-              <a:rPr lang="it-IT" dirty="0" err="1"/>
-              <a:t>Analisys</a:t>
-            </a:r>
-            <a:r>
-              <a:rPr lang="it-IT" dirty="0"/>
-              <a:t> &amp; </a:t>
-            </a:r>
-            <a:r>
-              <a:rPr lang="it-IT" dirty="0" err="1"/>
-              <a:t>ThingSpeak</a:t>
-            </a:r>
-            <a:endParaRPr lang="it-IT" dirty="0"/>
+              <a:t>State Control</a:t>
+            </a:r>
           </a:p>
         </p:txBody>
       </p:sp>
     </p:spTree>
     <p:extLst>
       <p:ext uri="{BB962C8B-B14F-4D97-AF65-F5344CB8AC3E}">
-        <p14:creationId xmlns:p14="http://schemas.microsoft.com/office/powerpoint/2010/main" val="2452805005"/>
+        <p14:creationId xmlns:p14="http://schemas.microsoft.com/office/powerpoint/2010/main" val="622032191"/>
       </p:ext>
     </p:extLst>
   </p:cSld>
@@ -6584,6 +6345,78 @@
           <p:cNvPr id="2" name="Title 1">
             <a:extLst>
               <a:ext uri="{FF2B5EF4-FFF2-40B4-BE49-F238E27FC236}">
+                <a16:creationId xmlns:a16="http://schemas.microsoft.com/office/drawing/2014/main" id="{77BC3930-B11C-B4C8-CFAC-0FB08E550117}"/>
+              </a:ext>
+            </a:extLst>
+          </p:cNvPr>
+          <p:cNvSpPr>
+            <a:spLocks noGrp="1"/>
+          </p:cNvSpPr>
+          <p:nvPr>
+            <p:ph type="title"/>
+          </p:nvPr>
+        </p:nvSpPr>
+        <p:spPr/>
+        <p:txBody>
+          <a:bodyPr/>
+          <a:lstStyle/>
+          <a:p>
+            <a:pPr algn="ctr"/>
+            <a:r>
+              <a:rPr lang="it-IT" dirty="0"/>
+              <a:t>Data </a:t>
+            </a:r>
+            <a:r>
+              <a:rPr lang="it-IT" dirty="0" err="1"/>
+              <a:t>Analisys</a:t>
+            </a:r>
+            <a:r>
+              <a:rPr lang="it-IT" dirty="0"/>
+              <a:t> &amp; </a:t>
+            </a:r>
+            <a:r>
+              <a:rPr lang="it-IT" dirty="0" err="1"/>
+              <a:t>ThingSpeak</a:t>
+            </a:r>
+            <a:endParaRPr lang="it-IT" dirty="0"/>
+          </a:p>
+        </p:txBody>
+      </p:sp>
+    </p:spTree>
+    <p:extLst>
+      <p:ext uri="{BB962C8B-B14F-4D97-AF65-F5344CB8AC3E}">
+        <p14:creationId xmlns:p14="http://schemas.microsoft.com/office/powerpoint/2010/main" val="2452805005"/>
+      </p:ext>
+    </p:extLst>
+  </p:cSld>
+  <p:clrMapOvr>
+    <a:masterClrMapping/>
+  </p:clrMapOvr>
+</p:sld>
+</file>
+
+<file path=ppt/slides/slide12.xml><?xml version="1.0" encoding="utf-8"?>
+<p:sld xmlns:a="http://schemas.openxmlformats.org/drawingml/2006/main" xmlns:r="http://schemas.openxmlformats.org/officeDocument/2006/relationships" xmlns:p="http://schemas.openxmlformats.org/presentationml/2006/main">
+  <p:cSld>
+    <p:spTree>
+      <p:nvGrpSpPr>
+        <p:cNvPr id="1" name=""/>
+        <p:cNvGrpSpPr/>
+        <p:nvPr/>
+      </p:nvGrpSpPr>
+      <p:grpSpPr>
+        <a:xfrm>
+          <a:off x="0" y="0"/>
+          <a:ext cx="0" cy="0"/>
+          <a:chOff x="0" y="0"/>
+          <a:chExt cx="0" cy="0"/>
+        </a:xfrm>
+      </p:grpSpPr>
+      <p:sp>
+        <p:nvSpPr>
+          <p:cNvPr id="2" name="Title 1">
+            <a:extLst>
+              <a:ext uri="{FF2B5EF4-FFF2-40B4-BE49-F238E27FC236}">
                 <a16:creationId xmlns:a16="http://schemas.microsoft.com/office/drawing/2014/main" id="{10DD3155-2DEF-DCFE-ADCC-0E413E96D207}"/>
               </a:ext>
             </a:extLst>
@@ -6629,7 +6462,7 @@
 </p:sld>
 </file>
 
-<file path=ppt/slides/slide12.xml><?xml version="1.0" encoding="utf-8"?>
+<file path=ppt/slides/slide13.xml><?xml version="1.0" encoding="utf-8"?>
 <p:sld xmlns:a="http://schemas.openxmlformats.org/drawingml/2006/main" xmlns:r="http://schemas.openxmlformats.org/officeDocument/2006/relationships" xmlns:p="http://schemas.openxmlformats.org/presentationml/2006/main">
   <p:cSld>
     <p:spTree>
@@ -7451,10 +7284,10 @@
       </p:sp>
       <p:pic>
         <p:nvPicPr>
-          <p:cNvPr id="4" name="Picture 3">
+          <p:cNvPr id="7" name="Picture 6">
             <a:extLst>
               <a:ext uri="{FF2B5EF4-FFF2-40B4-BE49-F238E27FC236}">
-                <a16:creationId xmlns:a16="http://schemas.microsoft.com/office/drawing/2014/main" id="{6087758D-38E7-2B97-8C11-04C20FC89D38}"/>
+                <a16:creationId xmlns:a16="http://schemas.microsoft.com/office/drawing/2014/main" id="{8549F90F-0168-72BB-07BB-CCBDE2DA712B}"/>
               </a:ext>
             </a:extLst>
           </p:cNvPr>
@@ -7465,457 +7298,19 @@
         </p:nvPicPr>
         <p:blipFill rotWithShape="1">
           <a:blip r:embed="rId2"/>
-          <a:srcRect t="-796" b="1"/>
+          <a:srcRect l="835"/>
           <a:stretch/>
         </p:blipFill>
         <p:spPr>
           <a:xfrm>
-            <a:off x="677334" y="1483567"/>
-            <a:ext cx="8596667" cy="4866496"/>
+            <a:off x="429208" y="1439813"/>
+            <a:ext cx="8212403" cy="4621975"/>
           </a:xfrm>
           <a:prstGeom prst="rect">
             <a:avLst/>
           </a:prstGeom>
-          <a:solidFill>
-            <a:srgbClr val="FFFFFF">
-              <a:shade val="85000"/>
-            </a:srgbClr>
-          </a:solidFill>
-          <a:ln w="88900" cap="sq">
-            <a:solidFill>
-              <a:srgbClr val="FFFFFF"/>
-            </a:solidFill>
-            <a:miter lim="800000"/>
-          </a:ln>
-          <a:effectLst>
-            <a:outerShdw blurRad="55000" dist="18000" dir="5400000" algn="tl" rotWithShape="0">
-              <a:srgbClr val="000000">
-                <a:alpha val="40000"/>
-              </a:srgbClr>
-            </a:outerShdw>
-          </a:effectLst>
-          <a:scene3d>
-            <a:camera prst="orthographicFront"/>
-            <a:lightRig rig="twoPt" dir="t">
-              <a:rot lat="0" lon="0" rev="7200000"/>
-            </a:lightRig>
-          </a:scene3d>
-          <a:sp3d>
-            <a:bevelT w="25400" h="19050"/>
-            <a:contourClr>
-              <a:srgbClr val="FFFFFF"/>
-            </a:contourClr>
-          </a:sp3d>
         </p:spPr>
       </p:pic>
-      <mc:AlternateContent xmlns:mc="http://schemas.openxmlformats.org/markup-compatibility/2006">
-        <mc:Choice xmlns:p14="http://schemas.microsoft.com/office/powerpoint/2010/main" Requires="p14">
-          <p:contentPart p14:bwMode="auto" r:id="rId3">
-            <p14:nvContentPartPr>
-              <p14:cNvPr id="5" name="Ink 4">
-                <a:extLst>
-                  <a:ext uri="{FF2B5EF4-FFF2-40B4-BE49-F238E27FC236}">
-                    <a16:creationId xmlns:a16="http://schemas.microsoft.com/office/drawing/2014/main" id="{E10870E8-A4C8-18BD-1CFA-64E5F62CBAB9}"/>
-                  </a:ext>
-                </a:extLst>
-              </p14:cNvPr>
-              <p14:cNvContentPartPr/>
-              <p14:nvPr/>
-            </p14:nvContentPartPr>
-            <p14:xfrm>
-              <a:off x="6629220" y="3951885"/>
-              <a:ext cx="1181880" cy="39600"/>
-            </p14:xfrm>
-          </p:contentPart>
-        </mc:Choice>
-        <mc:Fallback>
-          <p:pic>
-            <p:nvPicPr>
-              <p:cNvPr id="5" name="Ink 4">
-                <a:extLst>
-                  <a:ext uri="{FF2B5EF4-FFF2-40B4-BE49-F238E27FC236}">
-                    <a16:creationId xmlns:a16="http://schemas.microsoft.com/office/drawing/2014/main" id="{E10870E8-A4C8-18BD-1CFA-64E5F62CBAB9}"/>
-                  </a:ext>
-                </a:extLst>
-              </p:cNvPr>
-              <p:cNvPicPr/>
-              <p:nvPr/>
-            </p:nvPicPr>
-            <p:blipFill>
-              <a:blip r:embed="rId4"/>
-              <a:stretch>
-                <a:fillRect/>
-              </a:stretch>
-            </p:blipFill>
-            <p:spPr>
-              <a:xfrm>
-                <a:off x="6575580" y="3843885"/>
-                <a:ext cx="1289520" cy="255240"/>
-              </a:xfrm>
-              <a:prstGeom prst="rect">
-                <a:avLst/>
-              </a:prstGeom>
-            </p:spPr>
-          </p:pic>
-        </mc:Fallback>
-      </mc:AlternateContent>
-      <mc:AlternateContent xmlns:mc="http://schemas.openxmlformats.org/markup-compatibility/2006">
-        <mc:Choice xmlns:p14="http://schemas.microsoft.com/office/powerpoint/2010/main" Requires="p14">
-          <p:contentPart p14:bwMode="auto" r:id="rId5">
-            <p14:nvContentPartPr>
-              <p14:cNvPr id="6" name="Ink 5">
-                <a:extLst>
-                  <a:ext uri="{FF2B5EF4-FFF2-40B4-BE49-F238E27FC236}">
-                    <a16:creationId xmlns:a16="http://schemas.microsoft.com/office/drawing/2014/main" id="{466421DB-3153-1987-43B3-84D3821D51C8}"/>
-                  </a:ext>
-                </a:extLst>
-              </p14:cNvPr>
-              <p14:cNvContentPartPr/>
-              <p14:nvPr/>
-            </p14:nvContentPartPr>
-            <p14:xfrm>
-              <a:off x="6571980" y="4152405"/>
-              <a:ext cx="937080" cy="11160"/>
-            </p14:xfrm>
-          </p:contentPart>
-        </mc:Choice>
-        <mc:Fallback>
-          <p:pic>
-            <p:nvPicPr>
-              <p:cNvPr id="6" name="Ink 5">
-                <a:extLst>
-                  <a:ext uri="{FF2B5EF4-FFF2-40B4-BE49-F238E27FC236}">
-                    <a16:creationId xmlns:a16="http://schemas.microsoft.com/office/drawing/2014/main" id="{466421DB-3153-1987-43B3-84D3821D51C8}"/>
-                  </a:ext>
-                </a:extLst>
-              </p:cNvPr>
-              <p:cNvPicPr/>
-              <p:nvPr/>
-            </p:nvPicPr>
-            <p:blipFill>
-              <a:blip r:embed="rId6"/>
-              <a:stretch>
-                <a:fillRect/>
-              </a:stretch>
-            </p:blipFill>
-            <p:spPr>
-              <a:xfrm>
-                <a:off x="6518340" y="4044765"/>
-                <a:ext cx="1044720" cy="226800"/>
-              </a:xfrm>
-              <a:prstGeom prst="rect">
-                <a:avLst/>
-              </a:prstGeom>
-            </p:spPr>
-          </p:pic>
-        </mc:Fallback>
-      </mc:AlternateContent>
-      <mc:AlternateContent xmlns:mc="http://schemas.openxmlformats.org/markup-compatibility/2006">
-        <mc:Choice xmlns:p14="http://schemas.microsoft.com/office/powerpoint/2010/main" Requires="p14">
-          <p:contentPart p14:bwMode="auto" r:id="rId7">
-            <p14:nvContentPartPr>
-              <p14:cNvPr id="9" name="Ink 8">
-                <a:extLst>
-                  <a:ext uri="{FF2B5EF4-FFF2-40B4-BE49-F238E27FC236}">
-                    <a16:creationId xmlns:a16="http://schemas.microsoft.com/office/drawing/2014/main" id="{0F509B4E-08F9-23B8-9666-85CCDA19116A}"/>
-                  </a:ext>
-                </a:extLst>
-              </p14:cNvPr>
-              <p14:cNvContentPartPr/>
-              <p14:nvPr/>
-            </p14:nvContentPartPr>
-            <p14:xfrm>
-              <a:off x="6638580" y="5029005"/>
-              <a:ext cx="1199520" cy="48960"/>
-            </p14:xfrm>
-          </p:contentPart>
-        </mc:Choice>
-        <mc:Fallback>
-          <p:pic>
-            <p:nvPicPr>
-              <p:cNvPr id="9" name="Ink 8">
-                <a:extLst>
-                  <a:ext uri="{FF2B5EF4-FFF2-40B4-BE49-F238E27FC236}">
-                    <a16:creationId xmlns:a16="http://schemas.microsoft.com/office/drawing/2014/main" id="{0F509B4E-08F9-23B8-9666-85CCDA19116A}"/>
-                  </a:ext>
-                </a:extLst>
-              </p:cNvPr>
-              <p:cNvPicPr/>
-              <p:nvPr/>
-            </p:nvPicPr>
-            <p:blipFill>
-              <a:blip r:embed="rId8"/>
-              <a:stretch>
-                <a:fillRect/>
-              </a:stretch>
-            </p:blipFill>
-            <p:spPr>
-              <a:xfrm>
-                <a:off x="6584940" y="4921365"/>
-                <a:ext cx="1307160" cy="264600"/>
-              </a:xfrm>
-              <a:prstGeom prst="rect">
-                <a:avLst/>
-              </a:prstGeom>
-            </p:spPr>
-          </p:pic>
-        </mc:Fallback>
-      </mc:AlternateContent>
-      <mc:AlternateContent xmlns:mc="http://schemas.openxmlformats.org/markup-compatibility/2006">
-        <mc:Choice xmlns:p14="http://schemas.microsoft.com/office/powerpoint/2010/main" Requires="p14">
-          <p:contentPart p14:bwMode="auto" r:id="rId9">
-            <p14:nvContentPartPr>
-              <p14:cNvPr id="10" name="Ink 9">
-                <a:extLst>
-                  <a:ext uri="{FF2B5EF4-FFF2-40B4-BE49-F238E27FC236}">
-                    <a16:creationId xmlns:a16="http://schemas.microsoft.com/office/drawing/2014/main" id="{821D2E16-ED25-582B-4F59-65110F44D1AE}"/>
-                  </a:ext>
-                </a:extLst>
-              </p14:cNvPr>
-              <p14:cNvContentPartPr/>
-              <p14:nvPr/>
-            </p14:nvContentPartPr>
-            <p14:xfrm>
-              <a:off x="6619860" y="5228805"/>
-              <a:ext cx="838080" cy="19800"/>
-            </p14:xfrm>
-          </p:contentPart>
-        </mc:Choice>
-        <mc:Fallback>
-          <p:pic>
-            <p:nvPicPr>
-              <p:cNvPr id="10" name="Ink 9">
-                <a:extLst>
-                  <a:ext uri="{FF2B5EF4-FFF2-40B4-BE49-F238E27FC236}">
-                    <a16:creationId xmlns:a16="http://schemas.microsoft.com/office/drawing/2014/main" id="{821D2E16-ED25-582B-4F59-65110F44D1AE}"/>
-                  </a:ext>
-                </a:extLst>
-              </p:cNvPr>
-              <p:cNvPicPr/>
-              <p:nvPr/>
-            </p:nvPicPr>
-            <p:blipFill>
-              <a:blip r:embed="rId10"/>
-              <a:stretch>
-                <a:fillRect/>
-              </a:stretch>
-            </p:blipFill>
-            <p:spPr>
-              <a:xfrm>
-                <a:off x="6565860" y="5121165"/>
-                <a:ext cx="945720" cy="235440"/>
-              </a:xfrm>
-              <a:prstGeom prst="rect">
-                <a:avLst/>
-              </a:prstGeom>
-            </p:spPr>
-          </p:pic>
-        </mc:Fallback>
-      </mc:AlternateContent>
-      <mc:AlternateContent xmlns:mc="http://schemas.openxmlformats.org/markup-compatibility/2006">
-        <mc:Choice xmlns:p14="http://schemas.microsoft.com/office/powerpoint/2010/main" Requires="p14">
-          <p:contentPart p14:bwMode="auto" r:id="rId11">
-            <p14:nvContentPartPr>
-              <p14:cNvPr id="11" name="Ink 10">
-                <a:extLst>
-                  <a:ext uri="{FF2B5EF4-FFF2-40B4-BE49-F238E27FC236}">
-                    <a16:creationId xmlns:a16="http://schemas.microsoft.com/office/drawing/2014/main" id="{FC9C3D5C-B056-8FE3-F260-D47D1C461766}"/>
-                  </a:ext>
-                </a:extLst>
-              </p14:cNvPr>
-              <p14:cNvContentPartPr/>
-              <p14:nvPr/>
-            </p14:nvContentPartPr>
-            <p14:xfrm>
-              <a:off x="6619860" y="4142325"/>
-              <a:ext cx="700920" cy="29880"/>
-            </p14:xfrm>
-          </p:contentPart>
-        </mc:Choice>
-        <mc:Fallback>
-          <p:pic>
-            <p:nvPicPr>
-              <p:cNvPr id="11" name="Ink 10">
-                <a:extLst>
-                  <a:ext uri="{FF2B5EF4-FFF2-40B4-BE49-F238E27FC236}">
-                    <a16:creationId xmlns:a16="http://schemas.microsoft.com/office/drawing/2014/main" id="{FC9C3D5C-B056-8FE3-F260-D47D1C461766}"/>
-                  </a:ext>
-                </a:extLst>
-              </p:cNvPr>
-              <p:cNvPicPr/>
-              <p:nvPr/>
-            </p:nvPicPr>
-            <p:blipFill>
-              <a:blip r:embed="rId12"/>
-              <a:stretch>
-                <a:fillRect/>
-              </a:stretch>
-            </p:blipFill>
-            <p:spPr>
-              <a:xfrm>
-                <a:off x="6565860" y="4034685"/>
-                <a:ext cx="808560" cy="245520"/>
-              </a:xfrm>
-              <a:prstGeom prst="rect">
-                <a:avLst/>
-              </a:prstGeom>
-            </p:spPr>
-          </p:pic>
-        </mc:Fallback>
-      </mc:AlternateContent>
-      <mc:AlternateContent xmlns:mc="http://schemas.openxmlformats.org/markup-compatibility/2006">
-        <mc:Choice xmlns:p14="http://schemas.microsoft.com/office/powerpoint/2010/main" Requires="p14">
-          <p:contentPart p14:bwMode="auto" r:id="rId13">
-            <p14:nvContentPartPr>
-              <p14:cNvPr id="12" name="Ink 11">
-                <a:extLst>
-                  <a:ext uri="{FF2B5EF4-FFF2-40B4-BE49-F238E27FC236}">
-                    <a16:creationId xmlns:a16="http://schemas.microsoft.com/office/drawing/2014/main" id="{906C1D48-F660-2A5B-8411-0175692EBEC8}"/>
-                  </a:ext>
-                </a:extLst>
-              </p14:cNvPr>
-              <p14:cNvContentPartPr/>
-              <p14:nvPr/>
-            </p14:nvContentPartPr>
-            <p14:xfrm>
-              <a:off x="6571980" y="3971325"/>
-              <a:ext cx="551520" cy="10080"/>
-            </p14:xfrm>
-          </p:contentPart>
-        </mc:Choice>
-        <mc:Fallback>
-          <p:pic>
-            <p:nvPicPr>
-              <p:cNvPr id="12" name="Ink 11">
-                <a:extLst>
-                  <a:ext uri="{FF2B5EF4-FFF2-40B4-BE49-F238E27FC236}">
-                    <a16:creationId xmlns:a16="http://schemas.microsoft.com/office/drawing/2014/main" id="{906C1D48-F660-2A5B-8411-0175692EBEC8}"/>
-                  </a:ext>
-                </a:extLst>
-              </p:cNvPr>
-              <p:cNvPicPr/>
-              <p:nvPr/>
-            </p:nvPicPr>
-            <p:blipFill>
-              <a:blip r:embed="rId14"/>
-              <a:stretch>
-                <a:fillRect/>
-              </a:stretch>
-            </p:blipFill>
-            <p:spPr>
-              <a:xfrm>
-                <a:off x="6518340" y="3863325"/>
-                <a:ext cx="659160" cy="225720"/>
-              </a:xfrm>
-              <a:prstGeom prst="rect">
-                <a:avLst/>
-              </a:prstGeom>
-            </p:spPr>
-          </p:pic>
-        </mc:Fallback>
-      </mc:AlternateContent>
-      <mc:AlternateContent xmlns:mc="http://schemas.openxmlformats.org/markup-compatibility/2006">
-        <mc:Choice xmlns:p14="http://schemas.microsoft.com/office/powerpoint/2010/main" Requires="p14">
-          <p:contentPart p14:bwMode="auto" r:id="rId15">
-            <p14:nvContentPartPr>
-              <p14:cNvPr id="14" name="Ink 13">
-                <a:extLst>
-                  <a:ext uri="{FF2B5EF4-FFF2-40B4-BE49-F238E27FC236}">
-                    <a16:creationId xmlns:a16="http://schemas.microsoft.com/office/drawing/2014/main" id="{4B460C16-14FA-7CB6-E3B7-6193C46F8CDA}"/>
-                  </a:ext>
-                </a:extLst>
-              </p14:cNvPr>
-              <p14:cNvContentPartPr/>
-              <p14:nvPr/>
-            </p14:nvContentPartPr>
-            <p14:xfrm>
-              <a:off x="6606088" y="5075750"/>
-              <a:ext cx="680400" cy="56880"/>
-            </p14:xfrm>
-          </p:contentPart>
-        </mc:Choice>
-        <mc:Fallback>
-          <p:pic>
-            <p:nvPicPr>
-              <p:cNvPr id="14" name="Ink 13">
-                <a:extLst>
-                  <a:ext uri="{FF2B5EF4-FFF2-40B4-BE49-F238E27FC236}">
-                    <a16:creationId xmlns:a16="http://schemas.microsoft.com/office/drawing/2014/main" id="{4B460C16-14FA-7CB6-E3B7-6193C46F8CDA}"/>
-                  </a:ext>
-                </a:extLst>
-              </p:cNvPr>
-              <p:cNvPicPr/>
-              <p:nvPr/>
-            </p:nvPicPr>
-            <p:blipFill>
-              <a:blip r:embed="rId16"/>
-              <a:stretch>
-                <a:fillRect/>
-              </a:stretch>
-            </p:blipFill>
-            <p:spPr>
-              <a:xfrm>
-                <a:off x="6552088" y="4967750"/>
-                <a:ext cx="788040" cy="272520"/>
-              </a:xfrm>
-              <a:prstGeom prst="rect">
-                <a:avLst/>
-              </a:prstGeom>
-            </p:spPr>
-          </p:pic>
-        </mc:Fallback>
-      </mc:AlternateContent>
-      <mc:AlternateContent xmlns:mc="http://schemas.openxmlformats.org/markup-compatibility/2006">
-        <mc:Choice xmlns:p14="http://schemas.microsoft.com/office/powerpoint/2010/main" Requires="p14">
-          <p:contentPart p14:bwMode="auto" r:id="rId17">
-            <p14:nvContentPartPr>
-              <p14:cNvPr id="16" name="Ink 15">
-                <a:extLst>
-                  <a:ext uri="{FF2B5EF4-FFF2-40B4-BE49-F238E27FC236}">
-                    <a16:creationId xmlns:a16="http://schemas.microsoft.com/office/drawing/2014/main" id="{DF4FF9D2-92C4-6891-EF01-8FA208CD3666}"/>
-                  </a:ext>
-                </a:extLst>
-              </p14:cNvPr>
-              <p14:cNvContentPartPr/>
-              <p14:nvPr/>
-            </p14:nvContentPartPr>
-            <p14:xfrm>
-              <a:off x="6661888" y="5009870"/>
-              <a:ext cx="911880" cy="65880"/>
-            </p14:xfrm>
-          </p:contentPart>
-        </mc:Choice>
-        <mc:Fallback>
-          <p:pic>
-            <p:nvPicPr>
-              <p:cNvPr id="16" name="Ink 15">
-                <a:extLst>
-                  <a:ext uri="{FF2B5EF4-FFF2-40B4-BE49-F238E27FC236}">
-                    <a16:creationId xmlns:a16="http://schemas.microsoft.com/office/drawing/2014/main" id="{DF4FF9D2-92C4-6891-EF01-8FA208CD3666}"/>
-                  </a:ext>
-                </a:extLst>
-              </p:cNvPr>
-              <p:cNvPicPr/>
-              <p:nvPr/>
-            </p:nvPicPr>
-            <p:blipFill>
-              <a:blip r:embed="rId18"/>
-              <a:stretch>
-                <a:fillRect/>
-              </a:stretch>
-            </p:blipFill>
-            <p:spPr>
-              <a:xfrm>
-                <a:off x="6608248" y="4902230"/>
-                <a:ext cx="1019520" cy="281520"/>
-              </a:xfrm>
-              <a:prstGeom prst="rect">
-                <a:avLst/>
-              </a:prstGeom>
-            </p:spPr>
-          </p:pic>
-        </mc:Fallback>
-      </mc:AlternateContent>
     </p:spTree>
     <p:extLst>
       <p:ext uri="{BB962C8B-B14F-4D97-AF65-F5344CB8AC3E}">
@@ -7951,7 +7346,7 @@
           <p:cNvPr id="2" name="Title 1">
             <a:extLst>
               <a:ext uri="{FF2B5EF4-FFF2-40B4-BE49-F238E27FC236}">
-                <a16:creationId xmlns:a16="http://schemas.microsoft.com/office/drawing/2014/main" id="{C5727A39-3120-BDEA-2583-D46E27C1035A}"/>
+                <a16:creationId xmlns:a16="http://schemas.microsoft.com/office/drawing/2014/main" id="{FA91EFE1-63FF-31A8-3D0F-B63E5AE018AF}"/>
               </a:ext>
             </a:extLst>
           </p:cNvPr>
@@ -7967,10 +7362,9 @@
           <a:bodyPr/>
           <a:lstStyle/>
           <a:p>
-            <a:pPr algn="ctr"/>
             <a:r>
               <a:rPr lang="it-IT" dirty="0"/>
-              <a:t>State Control</a:t>
+              <a:t>Control Strategy Agenda</a:t>
             </a:r>
           </a:p>
         </p:txBody>
@@ -7978,7 +7372,7 @@
     </p:spTree>
     <p:extLst>
       <p:ext uri="{BB962C8B-B14F-4D97-AF65-F5344CB8AC3E}">
-        <p14:creationId xmlns:p14="http://schemas.microsoft.com/office/powerpoint/2010/main" val="622032191"/>
+        <p14:creationId xmlns:p14="http://schemas.microsoft.com/office/powerpoint/2010/main" val="740816539"/>
       </p:ext>
     </p:extLst>
   </p:cSld>

</xml_diff>